<commit_message>
V.1.1.0 this version support both WiFi and 2G test updated the documentation
</commit_message>
<xml_diff>
--- a/Utility/USR_Test_HW_Support/Documentation/C780_HW_TEST_2G.pptx
+++ b/Utility/USR_Test_HW_Support/Documentation/C780_HW_TEST_2G.pptx
@@ -252,7 +252,7 @@
           <a:p>
             <a:fld id="{31921840-1B76-44BB-98DD-5857A1343252}" type="datetimeFigureOut">
               <a:rPr lang="it-IT" smtClean="0"/>
-              <a:t>16/07/2020</a:t>
+              <a:t>04/08/2020</a:t>
             </a:fld>
             <a:endParaRPr lang="it-IT"/>
           </a:p>
@@ -422,7 +422,7 @@
           <a:p>
             <a:fld id="{31921840-1B76-44BB-98DD-5857A1343252}" type="datetimeFigureOut">
               <a:rPr lang="it-IT" smtClean="0"/>
-              <a:t>16/07/2020</a:t>
+              <a:t>04/08/2020</a:t>
             </a:fld>
             <a:endParaRPr lang="it-IT"/>
           </a:p>
@@ -602,7 +602,7 @@
           <a:p>
             <a:fld id="{31921840-1B76-44BB-98DD-5857A1343252}" type="datetimeFigureOut">
               <a:rPr lang="it-IT" smtClean="0"/>
-              <a:t>16/07/2020</a:t>
+              <a:t>04/08/2020</a:t>
             </a:fld>
             <a:endParaRPr lang="it-IT"/>
           </a:p>
@@ -772,7 +772,7 @@
           <a:p>
             <a:fld id="{31921840-1B76-44BB-98DD-5857A1343252}" type="datetimeFigureOut">
               <a:rPr lang="it-IT" smtClean="0"/>
-              <a:t>16/07/2020</a:t>
+              <a:t>04/08/2020</a:t>
             </a:fld>
             <a:endParaRPr lang="it-IT"/>
           </a:p>
@@ -1018,7 +1018,7 @@
           <a:p>
             <a:fld id="{31921840-1B76-44BB-98DD-5857A1343252}" type="datetimeFigureOut">
               <a:rPr lang="it-IT" smtClean="0"/>
-              <a:t>16/07/2020</a:t>
+              <a:t>04/08/2020</a:t>
             </a:fld>
             <a:endParaRPr lang="it-IT"/>
           </a:p>
@@ -1250,7 +1250,7 @@
           <a:p>
             <a:fld id="{31921840-1B76-44BB-98DD-5857A1343252}" type="datetimeFigureOut">
               <a:rPr lang="it-IT" smtClean="0"/>
-              <a:t>16/07/2020</a:t>
+              <a:t>04/08/2020</a:t>
             </a:fld>
             <a:endParaRPr lang="it-IT"/>
           </a:p>
@@ -1617,7 +1617,7 @@
           <a:p>
             <a:fld id="{31921840-1B76-44BB-98DD-5857A1343252}" type="datetimeFigureOut">
               <a:rPr lang="it-IT" smtClean="0"/>
-              <a:t>16/07/2020</a:t>
+              <a:t>04/08/2020</a:t>
             </a:fld>
             <a:endParaRPr lang="it-IT"/>
           </a:p>
@@ -1735,7 +1735,7 @@
           <a:p>
             <a:fld id="{31921840-1B76-44BB-98DD-5857A1343252}" type="datetimeFigureOut">
               <a:rPr lang="it-IT" smtClean="0"/>
-              <a:t>16/07/2020</a:t>
+              <a:t>04/08/2020</a:t>
             </a:fld>
             <a:endParaRPr lang="it-IT"/>
           </a:p>
@@ -1830,7 +1830,7 @@
           <a:p>
             <a:fld id="{31921840-1B76-44BB-98DD-5857A1343252}" type="datetimeFigureOut">
               <a:rPr lang="it-IT" smtClean="0"/>
-              <a:t>16/07/2020</a:t>
+              <a:t>04/08/2020</a:t>
             </a:fld>
             <a:endParaRPr lang="it-IT"/>
           </a:p>
@@ -2107,7 +2107,7 @@
           <a:p>
             <a:fld id="{31921840-1B76-44BB-98DD-5857A1343252}" type="datetimeFigureOut">
               <a:rPr lang="it-IT" smtClean="0"/>
-              <a:t>16/07/2020</a:t>
+              <a:t>04/08/2020</a:t>
             </a:fld>
             <a:endParaRPr lang="it-IT"/>
           </a:p>
@@ -2360,7 +2360,7 @@
           <a:p>
             <a:fld id="{31921840-1B76-44BB-98DD-5857A1343252}" type="datetimeFigureOut">
               <a:rPr lang="it-IT" smtClean="0"/>
-              <a:t>16/07/2020</a:t>
+              <a:t>04/08/2020</a:t>
             </a:fld>
             <a:endParaRPr lang="it-IT"/>
           </a:p>
@@ -2573,7 +2573,7 @@
           <a:p>
             <a:fld id="{31921840-1B76-44BB-98DD-5857A1343252}" type="datetimeFigureOut">
               <a:rPr lang="it-IT" smtClean="0"/>
-              <a:t>16/07/2020</a:t>
+              <a:t>04/08/2020</a:t>
             </a:fld>
             <a:endParaRPr lang="it-IT"/>
           </a:p>
@@ -3050,15 +3050,7 @@
                   <a:schemeClr val="bg1"/>
                 </a:solidFill>
               </a:rPr>
-              <a:t>HW Test on production </a:t>
-            </a:r>
-            <a:r>
-              <a:rPr lang="it-IT" sz="4000" dirty="0" smtClean="0">
-                <a:solidFill>
-                  <a:schemeClr val="bg1"/>
-                </a:solidFill>
-              </a:rPr>
-              <a:t>line</a:t>
+              <a:t>HW Test on production line</a:t>
             </a:r>
             <a:br>
               <a:rPr lang="it-IT" sz="4000" dirty="0" smtClean="0">
@@ -3112,14 +3104,6 @@
                 </a:solidFill>
               </a:rPr>
               <a:t>V.1.0</a:t>
-            </a:r>
-            <a:r>
-              <a:rPr lang="it-IT" dirty="0" smtClean="0">
-                <a:solidFill>
-                  <a:schemeClr val="bg1"/>
-                </a:solidFill>
-              </a:rPr>
-              <a:t/>
             </a:r>
             <a:br>
               <a:rPr lang="it-IT" dirty="0" smtClean="0">
@@ -3614,12 +3598,21 @@
             </a:r>
             <a:r>
               <a:rPr lang="en-US" sz="1600" dirty="0"/>
-              <a:t>Take a look to the status led to see if </a:t>
+              <a:t>Take a look to the green </a:t>
+            </a:r>
+            <a:r>
+              <a:rPr lang="en-US" sz="1600" dirty="0" err="1"/>
+              <a:t>leds</a:t>
+            </a:r>
+            <a:r>
+              <a:rPr lang="en-US" sz="1600" dirty="0"/>
+              <a:t> to see if they blink in sequence it take some </a:t>
             </a:r>
             <a:r>
               <a:rPr lang="en-US" sz="1600" dirty="0" smtClean="0"/>
-              <a:t>blink“?“</a:t>
-            </a:r>
+              <a:t>time”</a:t>
+            </a:r>
+            <a:endParaRPr lang="en-US" sz="1600" dirty="0" smtClean="0"/>
           </a:p>
           <a:p>
             <a:pPr marL="228600" indent="-228600">
@@ -3696,7 +3689,6 @@
               <a:rPr lang="it-IT" sz="1600" dirty="0" smtClean="0"/>
               <a:t>EN</a:t>
             </a:r>
-            <a:endParaRPr lang="it-IT" sz="1600" dirty="0"/>
           </a:p>
           <a:p>
             <a:pPr marL="228600" indent="-228600">
@@ -3705,43 +3697,31 @@
             </a:pPr>
             <a:r>
               <a:rPr lang="it-IT" sz="1600" dirty="0"/>
-              <a:t> </a:t>
+              <a:t>Read the </a:t>
+            </a:r>
+            <a:r>
+              <a:rPr lang="it-IT" sz="1600" dirty="0" smtClean="0"/>
+              <a:t>IMEI via </a:t>
+            </a:r>
+            <a:r>
+              <a:rPr lang="it-IT" sz="1600" dirty="0"/>
+              <a:t>serial </a:t>
             </a:r>
             <a:r>
               <a:rPr lang="it-IT" sz="1600" dirty="0" err="1"/>
-              <a:t>Ask</a:t>
+              <a:t>port</a:t>
             </a:r>
             <a:r>
               <a:rPr lang="it-IT" sz="1600" dirty="0"/>
-              <a:t> the </a:t>
-            </a:r>
-            <a:r>
-              <a:rPr lang="it-IT" sz="1600" dirty="0" smtClean="0"/>
-              <a:t>operator </a:t>
-            </a:r>
-            <a:r>
-              <a:rPr lang="en-US" sz="1600" dirty="0" smtClean="0"/>
-              <a:t>"LED </a:t>
-            </a:r>
-            <a:r>
-              <a:rPr lang="en-US" sz="1600" dirty="0"/>
-              <a:t>STATUS TEST", "The status led have blinked green/red </a:t>
-            </a:r>
-            <a:r>
-              <a:rPr lang="en-US" sz="1600" dirty="0" smtClean="0"/>
-              <a:t>?"  </a:t>
-            </a:r>
-            <a:r>
-              <a:rPr lang="it-IT" sz="1600" dirty="0" err="1" smtClean="0"/>
+              <a:t>, </a:t>
+            </a:r>
+            <a:r>
+              <a:rPr lang="it-IT" sz="1600" dirty="0" err="1"/>
               <a:t>if</a:t>
             </a:r>
             <a:r>
-              <a:rPr lang="it-IT" sz="1600" dirty="0" smtClean="0"/>
-              <a:t> </a:t>
-            </a:r>
-            <a:r>
               <a:rPr lang="it-IT" sz="1600" dirty="0"/>
-              <a:t>yes go </a:t>
+              <a:t> yes go </a:t>
             </a:r>
             <a:r>
               <a:rPr lang="it-IT" sz="1600" dirty="0" err="1"/>
@@ -3757,8 +3737,13 @@
             </a:r>
             <a:r>
               <a:rPr lang="it-IT" sz="1600" dirty="0"/>
-              <a:t> stop the test</a:t>
-            </a:r>
+              <a:t> stop the </a:t>
+            </a:r>
+            <a:r>
+              <a:rPr lang="it-IT" sz="1600" dirty="0" err="1" smtClean="0"/>
+              <a:t>tes</a:t>
+            </a:r>
+            <a:endParaRPr lang="it-IT" sz="1600" dirty="0"/>
           </a:p>
           <a:p>
             <a:pPr marL="228600" indent="-228600">
@@ -3766,32 +3751,64 @@
               <a:buAutoNum type="arabicPeriod"/>
             </a:pPr>
             <a:r>
-              <a:rPr lang="it-IT" sz="1600" dirty="0" smtClean="0"/>
-              <a:t>Read the MAC </a:t>
-            </a:r>
-            <a:r>
-              <a:rPr lang="it-IT" sz="1600" dirty="0" err="1" smtClean="0"/>
-              <a:t>address</a:t>
-            </a:r>
-            <a:r>
-              <a:rPr lang="it-IT" sz="1600" dirty="0" smtClean="0"/>
-              <a:t> via serial </a:t>
-            </a:r>
-            <a:r>
-              <a:rPr lang="it-IT" sz="1600" dirty="0" err="1" smtClean="0"/>
-              <a:t>port</a:t>
-            </a:r>
-            <a:r>
-              <a:rPr lang="it-IT" sz="1600" dirty="0" smtClean="0"/>
-              <a:t>, </a:t>
+              <a:rPr lang="it-IT" sz="1600" dirty="0"/>
+              <a:t> </a:t>
             </a:r>
             <a:r>
               <a:rPr lang="it-IT" sz="1600" dirty="0" err="1"/>
+              <a:t>Ask</a:t>
+            </a:r>
+            <a:r>
+              <a:rPr lang="it-IT" sz="1600" dirty="0"/>
+              <a:t> the </a:t>
+            </a:r>
+            <a:r>
+              <a:rPr lang="it-IT" sz="1600" dirty="0" smtClean="0"/>
+              <a:t>operator </a:t>
+            </a:r>
+            <a:r>
+              <a:rPr lang="en-US" sz="1600" dirty="0" smtClean="0"/>
+              <a:t>"LED </a:t>
+            </a:r>
+            <a:r>
+              <a:rPr lang="en-US" sz="1600" dirty="0"/>
+              <a:t>STATUS TEST", </a:t>
+            </a:r>
+            <a:r>
+              <a:rPr lang="en-US" sz="1600" dirty="0" smtClean="0"/>
+              <a:t>"</a:t>
+            </a:r>
+            <a:r>
+              <a:rPr lang="en-US" sz="1600" dirty="0"/>
+              <a:t>The status </a:t>
+            </a:r>
+            <a:r>
+              <a:rPr lang="en-US" sz="1600" dirty="0" err="1"/>
+              <a:t>leds</a:t>
+            </a:r>
+            <a:r>
+              <a:rPr lang="en-US" sz="1600" dirty="0"/>
+              <a:t> have blinked in sequence </a:t>
+            </a:r>
+            <a:r>
+              <a:rPr lang="en-US" sz="1600" dirty="0" smtClean="0"/>
+              <a:t>?</a:t>
+            </a:r>
+            <a:r>
+              <a:rPr lang="en-US" sz="1600" dirty="0" smtClean="0"/>
+              <a:t>"  </a:t>
+            </a:r>
+            <a:r>
+              <a:rPr lang="it-IT" sz="1600" dirty="0" err="1" smtClean="0"/>
               <a:t>if</a:t>
             </a:r>
             <a:r>
+              <a:rPr lang="it-IT" sz="1600" dirty="0" smtClean="0"/>
+              <a:t> </a:t>
+            </a:r>
+            <a:r>
               <a:rPr lang="it-IT" sz="1600" dirty="0"/>
-              <a:t> yes go </a:t>
+              <a:t>yes go </a:t>
             </a:r>
             <a:r>
               <a:rPr lang="it-IT" sz="1600" dirty="0" err="1"/>
@@ -3821,7 +3838,11 @@
             </a:r>
             <a:r>
               <a:rPr lang="it-IT" sz="1600" dirty="0" smtClean="0"/>
-              <a:t> the SIM </a:t>
+              <a:t> </a:t>
+            </a:r>
+            <a:r>
+              <a:rPr lang="it-IT" sz="1600" dirty="0" smtClean="0"/>
+              <a:t>the SIM </a:t>
             </a:r>
             <a:r>
               <a:rPr lang="it-IT" sz="1600" dirty="0" err="1" smtClean="0"/>
@@ -3863,7 +3884,6 @@
               <a:rPr lang="it-IT" sz="1600" dirty="0" smtClean="0"/>
               <a:t>test</a:t>
             </a:r>
-            <a:endParaRPr lang="it-IT" sz="1600" dirty="0" smtClean="0"/>
           </a:p>
           <a:p>
             <a:pPr marL="228600" indent="-228600">
@@ -3876,11 +3896,7 @@
             </a:r>
             <a:r>
               <a:rPr lang="it-IT" sz="1600" dirty="0" smtClean="0"/>
-              <a:t> </a:t>
-            </a:r>
-            <a:r>
-              <a:rPr lang="it-IT" sz="1600" dirty="0" smtClean="0"/>
-              <a:t>to </a:t>
+              <a:t> to </a:t>
             </a:r>
             <a:r>
               <a:rPr lang="it-IT" sz="1600" dirty="0" err="1" smtClean="0"/>
@@ -3924,11 +3940,7 @@
             </a:r>
             <a:r>
               <a:rPr lang="it-IT" sz="1600" dirty="0" smtClean="0"/>
-              <a:t> stop the </a:t>
-            </a:r>
-            <a:r>
-              <a:rPr lang="it-IT" sz="1600" dirty="0" smtClean="0"/>
-              <a:t>test</a:t>
+              <a:t> stop the test</a:t>
             </a:r>
           </a:p>
           <a:p>
@@ -3942,11 +3954,7 @@
             </a:r>
             <a:r>
               <a:rPr lang="it-IT" sz="1600" dirty="0" smtClean="0"/>
-              <a:t> </a:t>
-            </a:r>
-            <a:r>
-              <a:rPr lang="it-IT" sz="1600" dirty="0" smtClean="0"/>
-              <a:t>to </a:t>
+              <a:t> to </a:t>
             </a:r>
             <a:r>
               <a:rPr lang="it-IT" sz="1600" dirty="0" err="1" smtClean="0"/>
@@ -4666,7 +4674,6 @@
               <a:rPr lang="it-IT" dirty="0" smtClean="0"/>
               <a:t>GME - 2G</a:t>
             </a:r>
-            <a:endParaRPr lang="it-IT" dirty="0" smtClean="0"/>
           </a:p>
           <a:p>
             <a:pPr algn="ctr"/>
@@ -8915,15 +8922,7 @@
                     <a:p>
                       <a:r>
                         <a:rPr lang="it-IT" dirty="0" smtClean="0"/>
-                        <a:t>The </a:t>
-                      </a:r>
-                      <a:r>
-                        <a:rPr lang="it-IT" dirty="0" smtClean="0"/>
-                        <a:t>IMEI of </a:t>
-                      </a:r>
-                      <a:r>
-                        <a:rPr lang="it-IT" dirty="0" smtClean="0"/>
-                        <a:t>the </a:t>
+                        <a:t>The IMEI of the </a:t>
                       </a:r>
                       <a:r>
                         <a:rPr lang="it-IT" dirty="0" err="1" smtClean="0"/>
@@ -10241,7 +10240,35 @@
             </a:r>
             <a:r>
               <a:rPr lang="it-IT" sz="1600" dirty="0" smtClean="0"/>
-              <a:t> the operator </a:t>
+              <a:t> the </a:t>
+            </a:r>
+            <a:r>
+              <a:rPr lang="it-IT" sz="1600" dirty="0" err="1" smtClean="0"/>
+              <a:t>field</a:t>
+            </a:r>
+            <a:r>
+              <a:rPr lang="it-IT" sz="1600" dirty="0"/>
+              <a:t> </a:t>
+            </a:r>
+            <a:r>
+              <a:rPr lang="it-IT" sz="1600" dirty="0" smtClean="0"/>
+              <a:t>GSMOPERATOR, </a:t>
+            </a:r>
+            <a:r>
+              <a:rPr lang="it-IT" sz="1600" dirty="0" err="1" smtClean="0"/>
+              <a:t>this</a:t>
+            </a:r>
+            <a:r>
+              <a:rPr lang="it-IT" sz="1600" dirty="0" smtClean="0"/>
+              <a:t> </a:t>
+            </a:r>
+            <a:r>
+              <a:rPr lang="it-IT" sz="1600" dirty="0" err="1" smtClean="0"/>
+              <a:t>is</a:t>
+            </a:r>
+            <a:r>
+              <a:rPr lang="it-IT" sz="1600" dirty="0" smtClean="0"/>
+              <a:t> the </a:t>
             </a:r>
             <a:r>
               <a:rPr lang="it-IT" sz="1600" dirty="0" err="1" smtClean="0"/>
@@ -10265,8 +10292,23 @@
             </a:r>
             <a:r>
               <a:rPr lang="it-IT" sz="1600" dirty="0" smtClean="0"/>
-              <a:t> AT+COPS, the easy way to determinate </a:t>
-            </a:r>
+              <a:t> </a:t>
+            </a:r>
+            <a:r>
+              <a:rPr lang="it-IT" sz="1600" dirty="0" smtClean="0"/>
+              <a:t>AT+COPS of the M95, </a:t>
+            </a:r>
+            <a:r>
+              <a:rPr lang="it-IT" sz="1600" dirty="0" smtClean="0"/>
+              <a:t>the easy way to determinate </a:t>
+            </a:r>
+            <a:r>
+              <a:rPr lang="it-IT" sz="1600" dirty="0" smtClean="0"/>
+              <a:t/>
+            </a:r>
+            <a:br>
+              <a:rPr lang="it-IT" sz="1600" dirty="0" smtClean="0"/>
+            </a:br>
             <a:r>
               <a:rPr lang="it-IT" sz="1600" dirty="0" err="1" smtClean="0"/>
               <a:t>it</a:t>
@@ -10297,18 +10339,19 @@
             </a:r>
             <a:r>
               <a:rPr lang="it-IT" sz="1600" dirty="0" smtClean="0"/>
-              <a:t/>
-            </a:r>
-            <a:br>
-              <a:rPr lang="it-IT" sz="1600" dirty="0" smtClean="0"/>
-            </a:br>
+              <a:t> </a:t>
+            </a:r>
             <a:r>
               <a:rPr lang="it-IT" sz="1600" dirty="0" err="1" smtClean="0"/>
               <a:t>initially</a:t>
             </a:r>
             <a:r>
               <a:rPr lang="it-IT" sz="1600" dirty="0" smtClean="0"/>
-              <a:t> with a </a:t>
+              <a:t> </a:t>
+            </a:r>
+            <a:r>
+              <a:rPr lang="it-IT" sz="1600" dirty="0" smtClean="0"/>
+              <a:t>with a </a:t>
             </a:r>
             <a:r>
               <a:rPr lang="it-IT" sz="1600" dirty="0" err="1" smtClean="0"/>
@@ -10388,7 +10431,18 @@
             </a:r>
             <a:r>
               <a:rPr lang="it-IT" sz="1600" dirty="0" smtClean="0"/>
-              <a:t> the </a:t>
+              <a:t> </a:t>
+            </a:r>
+            <a:r>
+              <a:rPr lang="it-IT" sz="1600" dirty="0" smtClean="0"/>
+              <a:t/>
+            </a:r>
+            <a:br>
+              <a:rPr lang="it-IT" sz="1600" dirty="0" smtClean="0"/>
+            </a:br>
+            <a:r>
+              <a:rPr lang="it-IT" sz="1600" dirty="0" smtClean="0"/>
+              <a:t>the </a:t>
             </a:r>
             <a:r>
               <a:rPr lang="it-IT" sz="1600" dirty="0" err="1" smtClean="0"/>
@@ -10398,9 +10452,6 @@
               <a:rPr lang="it-IT" sz="1600" dirty="0" smtClean="0"/>
               <a:t> in the </a:t>
             </a:r>
-            <a:br>
-              <a:rPr lang="it-IT" sz="1600" dirty="0" smtClean="0"/>
-            </a:br>
             <a:r>
               <a:rPr lang="it-IT" sz="1600" dirty="0" err="1" smtClean="0"/>
               <a:t>monitoring</a:t>
@@ -10415,6 +10466,14 @@
             </a:r>
             <a:r>
               <a:rPr lang="it-IT" sz="1600" dirty="0" smtClean="0"/>
+              <a:t>, </a:t>
+            </a:r>
+            <a:r>
+              <a:rPr lang="it-IT" sz="1600" dirty="0" err="1" smtClean="0"/>
+              <a:t>simply</a:t>
+            </a:r>
+            <a:r>
+              <a:rPr lang="it-IT" sz="1600" dirty="0" smtClean="0"/>
               <a:t> </a:t>
             </a:r>
             <a:r>
@@ -10434,28 +10493,20 @@
               <a:t> and </a:t>
             </a:r>
             <a:r>
-              <a:rPr lang="it-IT" sz="1600" dirty="0" err="1" smtClean="0"/>
-              <a:t>substitute</a:t>
-            </a:r>
-            <a:r>
-              <a:rPr lang="it-IT" sz="1600" dirty="0" smtClean="0"/>
-              <a:t> the «</a:t>
-            </a:r>
-            <a:r>
-              <a:rPr lang="it-IT" sz="1600" dirty="0" err="1" smtClean="0"/>
-              <a:t>testoperator</a:t>
-            </a:r>
-            <a:r>
-              <a:rPr lang="it-IT" sz="1600" dirty="0" smtClean="0"/>
-              <a:t>» </a:t>
-            </a:r>
-            <a:r>
-              <a:rPr lang="it-IT" sz="1600" dirty="0" err="1" smtClean="0"/>
-              <a:t>string</a:t>
+              <a:rPr lang="it-IT" sz="1600" dirty="0"/>
+              <a:t>set GSMOPERATOR </a:t>
+            </a:r>
+            <a:r>
+              <a:rPr lang="it-IT" sz="1600" dirty="0" err="1" smtClean="0"/>
+              <a:t>parameter</a:t>
             </a:r>
             <a:r>
               <a:rPr lang="it-IT" sz="1600" dirty="0" smtClean="0"/>
               <a:t>.</a:t>
+            </a:r>
+            <a:r>
+              <a:rPr lang="it-IT" sz="1600" dirty="0" smtClean="0"/>
+              <a:t/>
             </a:r>
             <a:br>
               <a:rPr lang="it-IT" sz="1600" dirty="0" smtClean="0"/>

</xml_diff>